<commit_message>
Starting the final report + change in approach
</commit_message>
<xml_diff>
--- a/Presentation - 2004842.pptx
+++ b/Presentation - 2004842.pptx
@@ -226,7 +226,7 @@
           <a:p>
             <a:fld id="{FE2D0424-88AF-2040-B531-8E258004F820}" type="datetimeFigureOut">
               <a:rPr lang="en-US" smtClean="0"/>
-              <a:t>3/14/23</a:t>
+              <a:t>4/1/2024</a:t>
             </a:fld>
             <a:endParaRPr lang="en-US"/>
           </a:p>
@@ -2376,7 +2376,7 @@
           <a:p>
             <a:fld id="{FC3905DF-8183-E24E-919F-5A8FF4DD98A6}" type="datetimeFigureOut">
               <a:rPr lang="en-US" smtClean="0"/>
-              <a:t>3/14/23</a:t>
+              <a:t>4/1/2024</a:t>
             </a:fld>
             <a:endParaRPr lang="en-US"/>
           </a:p>
@@ -2576,7 +2576,7 @@
           <a:p>
             <a:fld id="{FC3905DF-8183-E24E-919F-5A8FF4DD98A6}" type="datetimeFigureOut">
               <a:rPr lang="en-US" smtClean="0"/>
-              <a:t>3/14/23</a:t>
+              <a:t>4/1/2024</a:t>
             </a:fld>
             <a:endParaRPr lang="en-US"/>
           </a:p>
@@ -2786,7 +2786,7 @@
           <a:p>
             <a:fld id="{FC3905DF-8183-E24E-919F-5A8FF4DD98A6}" type="datetimeFigureOut">
               <a:rPr lang="en-US" smtClean="0"/>
-              <a:t>3/14/23</a:t>
+              <a:t>4/1/2024</a:t>
             </a:fld>
             <a:endParaRPr lang="en-US"/>
           </a:p>
@@ -2986,7 +2986,7 @@
           <a:p>
             <a:fld id="{FC3905DF-8183-E24E-919F-5A8FF4DD98A6}" type="datetimeFigureOut">
               <a:rPr lang="en-US" smtClean="0"/>
-              <a:t>3/14/23</a:t>
+              <a:t>4/1/2024</a:t>
             </a:fld>
             <a:endParaRPr lang="en-US"/>
           </a:p>
@@ -3262,7 +3262,7 @@
           <a:p>
             <a:fld id="{FC3905DF-8183-E24E-919F-5A8FF4DD98A6}" type="datetimeFigureOut">
               <a:rPr lang="en-US" smtClean="0"/>
-              <a:t>3/14/23</a:t>
+              <a:t>4/1/2024</a:t>
             </a:fld>
             <a:endParaRPr lang="en-US"/>
           </a:p>
@@ -3530,7 +3530,7 @@
           <a:p>
             <a:fld id="{FC3905DF-8183-E24E-919F-5A8FF4DD98A6}" type="datetimeFigureOut">
               <a:rPr lang="en-US" smtClean="0"/>
-              <a:t>3/14/23</a:t>
+              <a:t>4/1/2024</a:t>
             </a:fld>
             <a:endParaRPr lang="en-US"/>
           </a:p>
@@ -3945,7 +3945,7 @@
           <a:p>
             <a:fld id="{FC3905DF-8183-E24E-919F-5A8FF4DD98A6}" type="datetimeFigureOut">
               <a:rPr lang="en-US" smtClean="0"/>
-              <a:t>3/14/23</a:t>
+              <a:t>4/1/2024</a:t>
             </a:fld>
             <a:endParaRPr lang="en-US"/>
           </a:p>
@@ -4087,7 +4087,7 @@
           <a:p>
             <a:fld id="{FC3905DF-8183-E24E-919F-5A8FF4DD98A6}" type="datetimeFigureOut">
               <a:rPr lang="en-US" smtClean="0"/>
-              <a:t>3/14/23</a:t>
+              <a:t>4/1/2024</a:t>
             </a:fld>
             <a:endParaRPr lang="en-US"/>
           </a:p>
@@ -4200,7 +4200,7 @@
           <a:p>
             <a:fld id="{FC3905DF-8183-E24E-919F-5A8FF4DD98A6}" type="datetimeFigureOut">
               <a:rPr lang="en-US" smtClean="0"/>
-              <a:t>3/14/23</a:t>
+              <a:t>4/1/2024</a:t>
             </a:fld>
             <a:endParaRPr lang="en-US"/>
           </a:p>
@@ -4513,7 +4513,7 @@
           <a:p>
             <a:fld id="{FC3905DF-8183-E24E-919F-5A8FF4DD98A6}" type="datetimeFigureOut">
               <a:rPr lang="en-US" smtClean="0"/>
-              <a:t>3/14/23</a:t>
+              <a:t>4/1/2024</a:t>
             </a:fld>
             <a:endParaRPr lang="en-US"/>
           </a:p>
@@ -4802,7 +4802,7 @@
           <a:p>
             <a:fld id="{FC3905DF-8183-E24E-919F-5A8FF4DD98A6}" type="datetimeFigureOut">
               <a:rPr lang="en-US" smtClean="0"/>
-              <a:t>3/14/23</a:t>
+              <a:t>4/1/2024</a:t>
             </a:fld>
             <a:endParaRPr lang="en-US"/>
           </a:p>
@@ -5045,7 +5045,7 @@
           <a:p>
             <a:fld id="{FC3905DF-8183-E24E-919F-5A8FF4DD98A6}" type="datetimeFigureOut">
               <a:rPr lang="en-US" smtClean="0"/>
-              <a:t>3/14/23</a:t>
+              <a:t>4/1/2024</a:t>
             </a:fld>
             <a:endParaRPr lang="en-US"/>
           </a:p>
@@ -6445,8 +6445,8 @@
           </a:p>
         </p:txBody>
       </p:sp>
-      <mc:AlternateContent xmlns:mc="http://schemas.openxmlformats.org/markup-compatibility/2006">
-        <mc:Choice xmlns:a14="http://schemas.microsoft.com/office/drawing/2010/main" Requires="a14">
+      <mc:AlternateContent xmlns:mc="http://schemas.openxmlformats.org/markup-compatibility/2006" xmlns:a14="http://schemas.microsoft.com/office/drawing/2010/main">
+        <mc:Choice Requires="a14">
           <p:sp>
             <p:nvSpPr>
               <p:cNvPr id="3" name="Content Placeholder 2">
@@ -6771,7 +6771,7 @@
             </p:txBody>
           </p:sp>
         </mc:Choice>
-        <mc:Fallback>
+        <mc:Fallback xmlns="">
           <p:sp>
             <p:nvSpPr>
               <p:cNvPr id="3" name="Content Placeholder 2">
@@ -8642,8 +8642,8 @@
           </a:p>
         </p:txBody>
       </p:sp>
-      <mc:AlternateContent xmlns:mc="http://schemas.openxmlformats.org/markup-compatibility/2006">
-        <mc:Choice xmlns:a14="http://schemas.microsoft.com/office/drawing/2010/main" Requires="a14">
+      <mc:AlternateContent xmlns:mc="http://schemas.openxmlformats.org/markup-compatibility/2006" xmlns:a14="http://schemas.microsoft.com/office/drawing/2010/main">
+        <mc:Choice Requires="a14">
           <p:sp>
             <p:nvSpPr>
               <p:cNvPr id="3" name="Content Placeholder 2">
@@ -8930,7 +8930,7 @@
             </p:txBody>
           </p:sp>
         </mc:Choice>
-        <mc:Fallback>
+        <mc:Fallback xmlns="">
           <p:sp>
             <p:nvSpPr>
               <p:cNvPr id="3" name="Content Placeholder 2">
@@ -11800,8 +11800,8 @@
           </a:p>
         </p:txBody>
       </p:sp>
-      <mc:AlternateContent xmlns:mc="http://schemas.openxmlformats.org/markup-compatibility/2006">
-        <mc:Choice xmlns:a14="http://schemas.microsoft.com/office/drawing/2010/main" Requires="a14">
+      <mc:AlternateContent xmlns:mc="http://schemas.openxmlformats.org/markup-compatibility/2006" xmlns:a14="http://schemas.microsoft.com/office/drawing/2010/main">
+        <mc:Choice Requires="a14">
           <p:sp>
             <p:nvSpPr>
               <p:cNvPr id="3" name="Content Placeholder 2">
@@ -12172,7 +12172,7 @@
             </p:txBody>
           </p:sp>
         </mc:Choice>
-        <mc:Fallback>
+        <mc:Fallback xmlns="">
           <p:sp>
             <p:nvSpPr>
               <p:cNvPr id="3" name="Content Placeholder 2">
@@ -13052,8 +13052,8 @@
           </a:p>
         </p:txBody>
       </p:sp>
-      <mc:AlternateContent xmlns:mc="http://schemas.openxmlformats.org/markup-compatibility/2006">
-        <mc:Choice xmlns:a14="http://schemas.microsoft.com/office/drawing/2010/main" Requires="a14">
+      <mc:AlternateContent xmlns:mc="http://schemas.openxmlformats.org/markup-compatibility/2006" xmlns:a14="http://schemas.microsoft.com/office/drawing/2010/main">
+        <mc:Choice Requires="a14">
           <p:sp>
             <p:nvSpPr>
               <p:cNvPr id="3" name="Content Placeholder 2">
@@ -13439,7 +13439,7 @@
             </p:txBody>
           </p:sp>
         </mc:Choice>
-        <mc:Fallback>
+        <mc:Fallback xmlns="">
           <p:sp>
             <p:nvSpPr>
               <p:cNvPr id="3" name="Content Placeholder 2">
@@ -14665,8 +14665,8 @@
           </a:p>
         </p:txBody>
       </p:sp>
-      <mc:AlternateContent xmlns:mc="http://schemas.openxmlformats.org/markup-compatibility/2006">
-        <mc:Choice xmlns:a14="http://schemas.microsoft.com/office/drawing/2010/main" Requires="a14">
+      <mc:AlternateContent xmlns:mc="http://schemas.openxmlformats.org/markup-compatibility/2006" xmlns:a14="http://schemas.microsoft.com/office/drawing/2010/main">
+        <mc:Choice Requires="a14">
           <p:sp>
             <p:nvSpPr>
               <p:cNvPr id="3" name="Content Placeholder 2">
@@ -14903,7 +14903,7 @@
             </p:txBody>
           </p:sp>
         </mc:Choice>
-        <mc:Fallback>
+        <mc:Fallback xmlns="">
           <p:sp>
             <p:nvSpPr>
               <p:cNvPr id="3" name="Content Placeholder 2">

</xml_diff>